<commit_message>
add model evaluation and dataset
</commit_message>
<xml_diff>
--- a/Sunum.pptx
+++ b/Sunum.pptx
@@ -292,7 +292,7 @@
           </a:lstStyle>
           <a:p>
             <a:r>
-              <a:rPr lang="en-US" smtClean="0"/>
+              <a:rPr lang="en-US"/>
               <a:t>Click to edit Master title style</a:t>
             </a:r>
             <a:endParaRPr lang="en-US" dirty="0"/>
@@ -412,7 +412,7 @@
           </a:lstStyle>
           <a:p>
             <a:r>
-              <a:rPr lang="en-US" smtClean="0"/>
+              <a:rPr lang="en-US"/>
               <a:t>Click to edit Master subtitle style</a:t>
             </a:r>
             <a:endParaRPr lang="en-US" dirty="0"/>
@@ -451,7 +451,7 @@
           <a:p>
             <a:fld id="{1407A3B7-58FE-4A18-9F42-1771B36034B8}" type="datetimeFigureOut">
               <a:rPr lang="ar-SA" smtClean="0"/>
-              <a:t>14/12/1446</a:t>
+              <a:t>17/01/1447</a:t>
             </a:fld>
             <a:endParaRPr lang="ar-SA"/>
           </a:p>
@@ -1362,7 +1362,7 @@
           </a:lstStyle>
           <a:p>
             <a:r>
-              <a:rPr lang="en-US" smtClean="0"/>
+              <a:rPr lang="en-US"/>
               <a:t>Click to edit Master title style</a:t>
             </a:r>
             <a:endParaRPr lang="en-US" dirty="0"/>
@@ -1441,7 +1441,7 @@
           </a:lstStyle>
           <a:p>
             <a:r>
-              <a:rPr lang="en-US" smtClean="0"/>
+              <a:rPr lang="en-US"/>
               <a:t>Click icon to add picture</a:t>
             </a:r>
             <a:endParaRPr lang="en-US" dirty="0"/>
@@ -1516,7 +1516,7 @@
           <a:p>
             <a:pPr lvl="0"/>
             <a:r>
-              <a:rPr lang="en-US" smtClean="0"/>
+              <a:rPr lang="en-US"/>
               <a:t>Click to edit Master text styles</a:t>
             </a:r>
           </a:p>
@@ -1539,7 +1539,7 @@
           <a:p>
             <a:fld id="{1407A3B7-58FE-4A18-9F42-1771B36034B8}" type="datetimeFigureOut">
               <a:rPr lang="ar-SA" smtClean="0"/>
-              <a:t>14/12/1446</a:t>
+              <a:t>17/01/1447</a:t>
             </a:fld>
             <a:endParaRPr lang="ar-SA"/>
           </a:p>
@@ -2428,7 +2428,7 @@
           </a:lstStyle>
           <a:p>
             <a:r>
-              <a:rPr lang="en-US" smtClean="0"/>
+              <a:rPr lang="en-US"/>
               <a:t>Click to edit Master title style</a:t>
             </a:r>
             <a:endParaRPr lang="en-US" dirty="0"/>
@@ -2496,7 +2496,7 @@
           <a:p>
             <a:pPr lvl="0"/>
             <a:r>
-              <a:rPr lang="en-US" smtClean="0"/>
+              <a:rPr lang="en-US"/>
               <a:t>Click to edit Master text styles</a:t>
             </a:r>
           </a:p>
@@ -2519,7 +2519,7 @@
           <a:p>
             <a:fld id="{1407A3B7-58FE-4A18-9F42-1771B36034B8}" type="datetimeFigureOut">
               <a:rPr lang="ar-SA" smtClean="0"/>
-              <a:t>14/12/1446</a:t>
+              <a:t>17/01/1447</a:t>
             </a:fld>
             <a:endParaRPr lang="ar-SA"/>
           </a:p>
@@ -3486,7 +3486,7 @@
           </a:lstStyle>
           <a:p>
             <a:r>
-              <a:rPr lang="en-US" smtClean="0"/>
+              <a:rPr lang="en-US"/>
               <a:t>Click to edit Master title style</a:t>
             </a:r>
             <a:endParaRPr lang="en-US" dirty="0"/>
@@ -3563,7 +3563,7 @@
           <a:p>
             <a:pPr lvl="0"/>
             <a:r>
-              <a:rPr lang="en-US" smtClean="0"/>
+              <a:rPr lang="en-US"/>
               <a:t>Click to edit Master text styles</a:t>
             </a:r>
           </a:p>
@@ -3630,7 +3630,7 @@
           <a:p>
             <a:pPr lvl="0"/>
             <a:r>
-              <a:rPr lang="en-US" smtClean="0"/>
+              <a:rPr lang="en-US"/>
               <a:t>Click to edit Master text styles</a:t>
             </a:r>
           </a:p>
@@ -3653,7 +3653,7 @@
           <a:p>
             <a:fld id="{1407A3B7-58FE-4A18-9F42-1771B36034B8}" type="datetimeFigureOut">
               <a:rPr lang="ar-SA" smtClean="0"/>
-              <a:t>14/12/1446</a:t>
+              <a:t>17/01/1447</a:t>
             </a:fld>
             <a:endParaRPr lang="ar-SA"/>
           </a:p>
@@ -4542,7 +4542,7 @@
           </a:lstStyle>
           <a:p>
             <a:r>
-              <a:rPr lang="en-US" smtClean="0"/>
+              <a:rPr lang="en-US"/>
               <a:t>Click to edit Master title style</a:t>
             </a:r>
             <a:endParaRPr lang="en-US" dirty="0"/>
@@ -4663,7 +4663,7 @@
           <a:p>
             <a:pPr lvl="0"/>
             <a:r>
-              <a:rPr lang="en-US" smtClean="0"/>
+              <a:rPr lang="en-US"/>
               <a:t>Click to edit Master text styles</a:t>
             </a:r>
           </a:p>
@@ -4686,7 +4686,7 @@
           <a:p>
             <a:fld id="{1407A3B7-58FE-4A18-9F42-1771B36034B8}" type="datetimeFigureOut">
               <a:rPr lang="ar-SA" smtClean="0"/>
-              <a:t>14/12/1446</a:t>
+              <a:t>17/01/1447</a:t>
             </a:fld>
             <a:endParaRPr lang="ar-SA"/>
           </a:p>
@@ -4825,7 +4825,7 @@
           </a:lstStyle>
           <a:p>
             <a:r>
-              <a:rPr lang="en-US" smtClean="0"/>
+              <a:rPr lang="en-US"/>
               <a:t>Click to edit Master title style</a:t>
             </a:r>
             <a:endParaRPr lang="en-US" dirty="0"/>
@@ -4900,7 +4900,7 @@
           <a:p>
             <a:pPr lvl="0"/>
             <a:r>
-              <a:rPr lang="en-US" smtClean="0"/>
+              <a:rPr lang="en-US"/>
               <a:t>Click to edit Master text styles</a:t>
             </a:r>
           </a:p>
@@ -4967,7 +4967,7 @@
           <a:p>
             <a:pPr lvl="0"/>
             <a:r>
-              <a:rPr lang="en-US" smtClean="0"/>
+              <a:rPr lang="en-US"/>
               <a:t>Click to edit Master text styles</a:t>
             </a:r>
           </a:p>
@@ -5041,7 +5041,7 @@
           <a:p>
             <a:pPr lvl="0"/>
             <a:r>
-              <a:rPr lang="en-US" smtClean="0"/>
+              <a:rPr lang="en-US"/>
               <a:t>Click to edit Master text styles</a:t>
             </a:r>
           </a:p>
@@ -5108,7 +5108,7 @@
           <a:p>
             <a:pPr lvl="0"/>
             <a:r>
-              <a:rPr lang="en-US" smtClean="0"/>
+              <a:rPr lang="en-US"/>
               <a:t>Click to edit Master text styles</a:t>
             </a:r>
           </a:p>
@@ -5182,7 +5182,7 @@
           <a:p>
             <a:pPr lvl="0"/>
             <a:r>
-              <a:rPr lang="en-US" smtClean="0"/>
+              <a:rPr lang="en-US"/>
               <a:t>Click to edit Master text styles</a:t>
             </a:r>
           </a:p>
@@ -5249,7 +5249,7 @@
           <a:p>
             <a:pPr lvl="0"/>
             <a:r>
-              <a:rPr lang="en-US" smtClean="0"/>
+              <a:rPr lang="en-US"/>
               <a:t>Click to edit Master text styles</a:t>
             </a:r>
           </a:p>
@@ -5346,7 +5346,7 @@
           <a:p>
             <a:fld id="{1407A3B7-58FE-4A18-9F42-1771B36034B8}" type="datetimeFigureOut">
               <a:rPr lang="ar-SA" smtClean="0"/>
-              <a:t>14/12/1446</a:t>
+              <a:t>17/01/1447</a:t>
             </a:fld>
             <a:endParaRPr lang="ar-SA"/>
           </a:p>
@@ -5449,7 +5449,7 @@
           </a:lstStyle>
           <a:p>
             <a:r>
-              <a:rPr lang="en-US" smtClean="0"/>
+              <a:rPr lang="en-US"/>
               <a:t>Click to edit Master title style</a:t>
             </a:r>
             <a:endParaRPr lang="en-US" dirty="0"/>
@@ -5524,7 +5524,7 @@
           <a:p>
             <a:pPr lvl="0"/>
             <a:r>
-              <a:rPr lang="en-US" smtClean="0"/>
+              <a:rPr lang="en-US"/>
               <a:t>Click to edit Master text styles</a:t>
             </a:r>
           </a:p>
@@ -5602,7 +5602,7 @@
           </a:lstStyle>
           <a:p>
             <a:r>
-              <a:rPr lang="en-US" smtClean="0"/>
+              <a:rPr lang="en-US"/>
               <a:t>Click icon to add picture</a:t>
             </a:r>
             <a:endParaRPr lang="en-US" dirty="0"/>
@@ -5670,7 +5670,7 @@
           <a:p>
             <a:pPr lvl="0"/>
             <a:r>
-              <a:rPr lang="en-US" smtClean="0"/>
+              <a:rPr lang="en-US"/>
               <a:t>Click to edit Master text styles</a:t>
             </a:r>
           </a:p>
@@ -5744,7 +5744,7 @@
           <a:p>
             <a:pPr lvl="0"/>
             <a:r>
-              <a:rPr lang="en-US" smtClean="0"/>
+              <a:rPr lang="en-US"/>
               <a:t>Click to edit Master text styles</a:t>
             </a:r>
           </a:p>
@@ -5822,7 +5822,7 @@
           </a:lstStyle>
           <a:p>
             <a:r>
-              <a:rPr lang="en-US" smtClean="0"/>
+              <a:rPr lang="en-US"/>
               <a:t>Click icon to add picture</a:t>
             </a:r>
             <a:endParaRPr lang="en-US" dirty="0"/>
@@ -5890,7 +5890,7 @@
           <a:p>
             <a:pPr lvl="0"/>
             <a:r>
-              <a:rPr lang="en-US" smtClean="0"/>
+              <a:rPr lang="en-US"/>
               <a:t>Click to edit Master text styles</a:t>
             </a:r>
           </a:p>
@@ -5964,7 +5964,7 @@
           <a:p>
             <a:pPr lvl="0"/>
             <a:r>
-              <a:rPr lang="en-US" smtClean="0"/>
+              <a:rPr lang="en-US"/>
               <a:t>Click to edit Master text styles</a:t>
             </a:r>
           </a:p>
@@ -6042,7 +6042,7 @@
           </a:lstStyle>
           <a:p>
             <a:r>
-              <a:rPr lang="en-US" smtClean="0"/>
+              <a:rPr lang="en-US"/>
               <a:t>Click icon to add picture</a:t>
             </a:r>
             <a:endParaRPr lang="en-US" dirty="0"/>
@@ -6110,7 +6110,7 @@
           <a:p>
             <a:pPr lvl="0"/>
             <a:r>
-              <a:rPr lang="en-US" smtClean="0"/>
+              <a:rPr lang="en-US"/>
               <a:t>Click to edit Master text styles</a:t>
             </a:r>
           </a:p>
@@ -6207,7 +6207,7 @@
           <a:p>
             <a:fld id="{1407A3B7-58FE-4A18-9F42-1771B36034B8}" type="datetimeFigureOut">
               <a:rPr lang="ar-SA" smtClean="0"/>
-              <a:t>14/12/1446</a:t>
+              <a:t>17/01/1447</a:t>
             </a:fld>
             <a:endParaRPr lang="ar-SA"/>
           </a:p>
@@ -6311,7 +6311,7 @@
           <a:lstStyle/>
           <a:p>
             <a:r>
-              <a:rPr lang="en-US" smtClean="0"/>
+              <a:rPr lang="en-US"/>
               <a:t>Click to edit Master title style</a:t>
             </a:r>
             <a:endParaRPr lang="en-US" dirty="0"/>
@@ -6340,35 +6340,35 @@
           <a:p>
             <a:pPr lvl="0"/>
             <a:r>
-              <a:rPr lang="en-US" smtClean="0"/>
+              <a:rPr lang="en-US"/>
               <a:t>Click to edit Master text styles</a:t>
             </a:r>
           </a:p>
           <a:p>
             <a:pPr lvl="1"/>
             <a:r>
-              <a:rPr lang="en-US" smtClean="0"/>
+              <a:rPr lang="en-US"/>
               <a:t>Second level</a:t>
             </a:r>
           </a:p>
           <a:p>
             <a:pPr lvl="2"/>
             <a:r>
-              <a:rPr lang="en-US" smtClean="0"/>
+              <a:rPr lang="en-US"/>
               <a:t>Third level</a:t>
             </a:r>
           </a:p>
           <a:p>
             <a:pPr lvl="3"/>
             <a:r>
-              <a:rPr lang="en-US" smtClean="0"/>
+              <a:rPr lang="en-US"/>
               <a:t>Fourth level</a:t>
             </a:r>
           </a:p>
           <a:p>
             <a:pPr lvl="4"/>
             <a:r>
-              <a:rPr lang="en-US" smtClean="0"/>
+              <a:rPr lang="en-US"/>
               <a:t>Fifth level</a:t>
             </a:r>
             <a:endParaRPr lang="en-US" dirty="0"/>
@@ -6397,7 +6397,7 @@
           <a:p>
             <a:fld id="{1407A3B7-58FE-4A18-9F42-1771B36034B8}" type="datetimeFigureOut">
               <a:rPr lang="ar-SA" smtClean="0"/>
-              <a:t>14/12/1446</a:t>
+              <a:t>17/01/1447</a:t>
             </a:fld>
             <a:endParaRPr lang="ar-SA"/>
           </a:p>
@@ -7283,7 +7283,7 @@
           <a:lstStyle/>
           <a:p>
             <a:r>
-              <a:rPr lang="en-US" smtClean="0"/>
+              <a:rPr lang="en-US"/>
               <a:t>Click to edit Master title style</a:t>
             </a:r>
             <a:endParaRPr lang="en-US" dirty="0"/>
@@ -7312,35 +7312,35 @@
           <a:p>
             <a:pPr lvl="0"/>
             <a:r>
-              <a:rPr lang="en-US" smtClean="0"/>
+              <a:rPr lang="en-US"/>
               <a:t>Click to edit Master text styles</a:t>
             </a:r>
           </a:p>
           <a:p>
             <a:pPr lvl="1"/>
             <a:r>
-              <a:rPr lang="en-US" smtClean="0"/>
+              <a:rPr lang="en-US"/>
               <a:t>Second level</a:t>
             </a:r>
           </a:p>
           <a:p>
             <a:pPr lvl="2"/>
             <a:r>
-              <a:rPr lang="en-US" smtClean="0"/>
+              <a:rPr lang="en-US"/>
               <a:t>Third level</a:t>
             </a:r>
           </a:p>
           <a:p>
             <a:pPr lvl="3"/>
             <a:r>
-              <a:rPr lang="en-US" smtClean="0"/>
+              <a:rPr lang="en-US"/>
               <a:t>Fourth level</a:t>
             </a:r>
           </a:p>
           <a:p>
             <a:pPr lvl="4"/>
             <a:r>
-              <a:rPr lang="en-US" smtClean="0"/>
+              <a:rPr lang="en-US"/>
               <a:t>Fifth level</a:t>
             </a:r>
             <a:endParaRPr lang="en-US" dirty="0"/>
@@ -7369,7 +7369,7 @@
           <a:p>
             <a:fld id="{1407A3B7-58FE-4A18-9F42-1771B36034B8}" type="datetimeFigureOut">
               <a:rPr lang="ar-SA" smtClean="0"/>
-              <a:t>14/12/1446</a:t>
+              <a:t>17/01/1447</a:t>
             </a:fld>
             <a:endParaRPr lang="ar-SA"/>
           </a:p>
@@ -7499,7 +7499,7 @@
           <a:lstStyle/>
           <a:p>
             <a:r>
-              <a:rPr lang="en-US" smtClean="0"/>
+              <a:rPr lang="en-US"/>
               <a:t>Click to edit Master title style</a:t>
             </a:r>
             <a:endParaRPr lang="en-US" dirty="0"/>
@@ -7528,35 +7528,35 @@
           <a:p>
             <a:pPr lvl="0"/>
             <a:r>
-              <a:rPr lang="en-US" smtClean="0"/>
+              <a:rPr lang="en-US"/>
               <a:t>Click to edit Master text styles</a:t>
             </a:r>
           </a:p>
           <a:p>
             <a:pPr lvl="1"/>
             <a:r>
-              <a:rPr lang="en-US" smtClean="0"/>
+              <a:rPr lang="en-US"/>
               <a:t>Second level</a:t>
             </a:r>
           </a:p>
           <a:p>
             <a:pPr lvl="2"/>
             <a:r>
-              <a:rPr lang="en-US" smtClean="0"/>
+              <a:rPr lang="en-US"/>
               <a:t>Third level</a:t>
             </a:r>
           </a:p>
           <a:p>
             <a:pPr lvl="3"/>
             <a:r>
-              <a:rPr lang="en-US" smtClean="0"/>
+              <a:rPr lang="en-US"/>
               <a:t>Fourth level</a:t>
             </a:r>
           </a:p>
           <a:p>
             <a:pPr lvl="4"/>
             <a:r>
-              <a:rPr lang="en-US" smtClean="0"/>
+              <a:rPr lang="en-US"/>
               <a:t>Fifth level</a:t>
             </a:r>
             <a:endParaRPr lang="en-US" dirty="0"/>
@@ -7580,7 +7580,7 @@
           <a:p>
             <a:fld id="{1407A3B7-58FE-4A18-9F42-1771B36034B8}" type="datetimeFigureOut">
               <a:rPr lang="ar-SA" smtClean="0"/>
-              <a:t>14/12/1446</a:t>
+              <a:t>17/01/1447</a:t>
             </a:fld>
             <a:endParaRPr lang="ar-SA"/>
           </a:p>
@@ -8470,7 +8470,7 @@
           </a:lstStyle>
           <a:p>
             <a:r>
-              <a:rPr lang="en-US" smtClean="0"/>
+              <a:rPr lang="en-US"/>
               <a:t>Click to edit Master title style</a:t>
             </a:r>
             <a:endParaRPr lang="en-US" dirty="0"/>
@@ -8591,7 +8591,7 @@
           <a:p>
             <a:pPr lvl="0"/>
             <a:r>
-              <a:rPr lang="en-US" smtClean="0"/>
+              <a:rPr lang="en-US"/>
               <a:t>Click to edit Master text styles</a:t>
             </a:r>
           </a:p>
@@ -8614,7 +8614,7 @@
           <a:p>
             <a:fld id="{1407A3B7-58FE-4A18-9F42-1771B36034B8}" type="datetimeFigureOut">
               <a:rPr lang="ar-SA" smtClean="0"/>
-              <a:t>14/12/1446</a:t>
+              <a:t>17/01/1447</a:t>
             </a:fld>
             <a:endParaRPr lang="ar-SA"/>
           </a:p>
@@ -8744,7 +8744,7 @@
           <a:lstStyle/>
           <a:p>
             <a:r>
-              <a:rPr lang="en-US" smtClean="0"/>
+              <a:rPr lang="en-US"/>
               <a:t>Click to edit Master title style</a:t>
             </a:r>
             <a:endParaRPr lang="en-US" dirty="0"/>
@@ -8775,35 +8775,35 @@
           <a:p>
             <a:pPr lvl="0"/>
             <a:r>
-              <a:rPr lang="en-US" smtClean="0"/>
+              <a:rPr lang="en-US"/>
               <a:t>Click to edit Master text styles</a:t>
             </a:r>
           </a:p>
           <a:p>
             <a:pPr lvl="1"/>
             <a:r>
-              <a:rPr lang="en-US" smtClean="0"/>
+              <a:rPr lang="en-US"/>
               <a:t>Second level</a:t>
             </a:r>
           </a:p>
           <a:p>
             <a:pPr lvl="2"/>
             <a:r>
-              <a:rPr lang="en-US" smtClean="0"/>
+              <a:rPr lang="en-US"/>
               <a:t>Third level</a:t>
             </a:r>
           </a:p>
           <a:p>
             <a:pPr lvl="3"/>
             <a:r>
-              <a:rPr lang="en-US" smtClean="0"/>
+              <a:rPr lang="en-US"/>
               <a:t>Fourth level</a:t>
             </a:r>
           </a:p>
           <a:p>
             <a:pPr lvl="4"/>
             <a:r>
-              <a:rPr lang="en-US" smtClean="0"/>
+              <a:rPr lang="en-US"/>
               <a:t>Fifth level</a:t>
             </a:r>
             <a:endParaRPr lang="en-US" dirty="0"/>
@@ -8834,35 +8834,35 @@
           <a:p>
             <a:pPr lvl="0"/>
             <a:r>
-              <a:rPr lang="en-US" smtClean="0"/>
+              <a:rPr lang="en-US"/>
               <a:t>Click to edit Master text styles</a:t>
             </a:r>
           </a:p>
           <a:p>
             <a:pPr lvl="1"/>
             <a:r>
-              <a:rPr lang="en-US" smtClean="0"/>
+              <a:rPr lang="en-US"/>
               <a:t>Second level</a:t>
             </a:r>
           </a:p>
           <a:p>
             <a:pPr lvl="2"/>
             <a:r>
-              <a:rPr lang="en-US" smtClean="0"/>
+              <a:rPr lang="en-US"/>
               <a:t>Third level</a:t>
             </a:r>
           </a:p>
           <a:p>
             <a:pPr lvl="3"/>
             <a:r>
-              <a:rPr lang="en-US" smtClean="0"/>
+              <a:rPr lang="en-US"/>
               <a:t>Fourth level</a:t>
             </a:r>
           </a:p>
           <a:p>
             <a:pPr lvl="4"/>
             <a:r>
-              <a:rPr lang="en-US" smtClean="0"/>
+              <a:rPr lang="en-US"/>
               <a:t>Fifth level</a:t>
             </a:r>
             <a:endParaRPr lang="en-US" dirty="0"/>
@@ -8886,7 +8886,7 @@
           <a:p>
             <a:fld id="{1407A3B7-58FE-4A18-9F42-1771B36034B8}" type="datetimeFigureOut">
               <a:rPr lang="ar-SA" smtClean="0"/>
-              <a:t>14/12/1446</a:t>
+              <a:t>17/01/1447</a:t>
             </a:fld>
             <a:endParaRPr lang="ar-SA"/>
           </a:p>
@@ -8984,7 +8984,7 @@
           </a:lstStyle>
           <a:p>
             <a:r>
-              <a:rPr lang="en-US" smtClean="0"/>
+              <a:rPr lang="en-US"/>
               <a:t>Click to edit Master title style</a:t>
             </a:r>
             <a:endParaRPr lang="en-US" dirty="0"/>
@@ -9056,7 +9056,7 @@
           <a:p>
             <a:pPr lvl="0"/>
             <a:r>
-              <a:rPr lang="en-US" smtClean="0"/>
+              <a:rPr lang="en-US"/>
               <a:t>Click to edit Master text styles</a:t>
             </a:r>
           </a:p>
@@ -9086,35 +9086,35 @@
           <a:p>
             <a:pPr lvl="0"/>
             <a:r>
-              <a:rPr lang="en-US" smtClean="0"/>
+              <a:rPr lang="en-US"/>
               <a:t>Click to edit Master text styles</a:t>
             </a:r>
           </a:p>
           <a:p>
             <a:pPr lvl="1"/>
             <a:r>
-              <a:rPr lang="en-US" smtClean="0"/>
+              <a:rPr lang="en-US"/>
               <a:t>Second level</a:t>
             </a:r>
           </a:p>
           <a:p>
             <a:pPr lvl="2"/>
             <a:r>
-              <a:rPr lang="en-US" smtClean="0"/>
+              <a:rPr lang="en-US"/>
               <a:t>Third level</a:t>
             </a:r>
           </a:p>
           <a:p>
             <a:pPr lvl="3"/>
             <a:r>
-              <a:rPr lang="en-US" smtClean="0"/>
+              <a:rPr lang="en-US"/>
               <a:t>Fourth level</a:t>
             </a:r>
           </a:p>
           <a:p>
             <a:pPr lvl="4"/>
             <a:r>
-              <a:rPr lang="en-US" smtClean="0"/>
+              <a:rPr lang="en-US"/>
               <a:t>Fifth level</a:t>
             </a:r>
             <a:endParaRPr lang="en-US" dirty="0"/>
@@ -9186,7 +9186,7 @@
           <a:p>
             <a:pPr lvl="0"/>
             <a:r>
-              <a:rPr lang="en-US" smtClean="0"/>
+              <a:rPr lang="en-US"/>
               <a:t>Click to edit Master text styles</a:t>
             </a:r>
           </a:p>
@@ -9244,35 +9244,35 @@
           <a:p>
             <a:pPr lvl="0"/>
             <a:r>
-              <a:rPr lang="en-US" smtClean="0"/>
+              <a:rPr lang="en-US"/>
               <a:t>Click to edit Master text styles</a:t>
             </a:r>
           </a:p>
           <a:p>
             <a:pPr lvl="1"/>
             <a:r>
-              <a:rPr lang="en-US" smtClean="0"/>
+              <a:rPr lang="en-US"/>
               <a:t>Second level</a:t>
             </a:r>
           </a:p>
           <a:p>
             <a:pPr lvl="2"/>
             <a:r>
-              <a:rPr lang="en-US" smtClean="0"/>
+              <a:rPr lang="en-US"/>
               <a:t>Third level</a:t>
             </a:r>
           </a:p>
           <a:p>
             <a:pPr lvl="3"/>
             <a:r>
-              <a:rPr lang="en-US" smtClean="0"/>
+              <a:rPr lang="en-US"/>
               <a:t>Fourth level</a:t>
             </a:r>
           </a:p>
           <a:p>
             <a:pPr lvl="4"/>
             <a:r>
-              <a:rPr lang="en-US" smtClean="0"/>
+              <a:rPr lang="en-US"/>
               <a:t>Fifth level</a:t>
             </a:r>
             <a:endParaRPr lang="en-US" dirty="0"/>
@@ -9296,7 +9296,7 @@
           <a:p>
             <a:fld id="{1407A3B7-58FE-4A18-9F42-1771B36034B8}" type="datetimeFigureOut">
               <a:rPr lang="ar-SA" smtClean="0"/>
-              <a:t>14/12/1446</a:t>
+              <a:t>17/01/1447</a:t>
             </a:fld>
             <a:endParaRPr lang="ar-SA"/>
           </a:p>
@@ -9399,7 +9399,7 @@
           </a:lstStyle>
           <a:p>
             <a:r>
-              <a:rPr lang="en-US" smtClean="0"/>
+              <a:rPr lang="en-US"/>
               <a:t>Click to edit Master title style</a:t>
             </a:r>
             <a:endParaRPr lang="en-US" dirty="0"/>
@@ -9423,7 +9423,7 @@
           <a:p>
             <a:fld id="{1407A3B7-58FE-4A18-9F42-1771B36034B8}" type="datetimeFigureOut">
               <a:rPr lang="ar-SA" smtClean="0"/>
-              <a:t>14/12/1446</a:t>
+              <a:t>17/01/1447</a:t>
             </a:fld>
             <a:endParaRPr lang="ar-SA"/>
           </a:p>
@@ -9518,7 +9518,7 @@
           <a:p>
             <a:fld id="{1407A3B7-58FE-4A18-9F42-1771B36034B8}" type="datetimeFigureOut">
               <a:rPr lang="ar-SA" smtClean="0"/>
-              <a:t>14/12/1446</a:t>
+              <a:t>17/01/1447</a:t>
             </a:fld>
             <a:endParaRPr lang="ar-SA"/>
           </a:p>
@@ -10444,7 +10444,7 @@
           </a:lstStyle>
           <a:p>
             <a:r>
-              <a:rPr lang="en-US" smtClean="0"/>
+              <a:rPr lang="en-US"/>
               <a:t>Click to edit Master title style</a:t>
             </a:r>
             <a:endParaRPr lang="en-US" dirty="0"/>
@@ -10475,35 +10475,35 @@
           <a:p>
             <a:pPr lvl="0"/>
             <a:r>
-              <a:rPr lang="en-US" smtClean="0"/>
+              <a:rPr lang="en-US"/>
               <a:t>Click to edit Master text styles</a:t>
             </a:r>
           </a:p>
           <a:p>
             <a:pPr lvl="1"/>
             <a:r>
-              <a:rPr lang="en-US" smtClean="0"/>
+              <a:rPr lang="en-US"/>
               <a:t>Second level</a:t>
             </a:r>
           </a:p>
           <a:p>
             <a:pPr lvl="2"/>
             <a:r>
-              <a:rPr lang="en-US" smtClean="0"/>
+              <a:rPr lang="en-US"/>
               <a:t>Third level</a:t>
             </a:r>
           </a:p>
           <a:p>
             <a:pPr lvl="3"/>
             <a:r>
-              <a:rPr lang="en-US" smtClean="0"/>
+              <a:rPr lang="en-US"/>
               <a:t>Fourth level</a:t>
             </a:r>
           </a:p>
           <a:p>
             <a:pPr lvl="4"/>
             <a:r>
-              <a:rPr lang="en-US" smtClean="0"/>
+              <a:rPr lang="en-US"/>
               <a:t>Fifth level</a:t>
             </a:r>
             <a:endParaRPr lang="en-US" dirty="0"/>
@@ -10576,7 +10576,7 @@
           <a:p>
             <a:pPr lvl="0"/>
             <a:r>
-              <a:rPr lang="en-US" smtClean="0"/>
+              <a:rPr lang="en-US"/>
               <a:t>Click to edit Master text styles</a:t>
             </a:r>
           </a:p>
@@ -10599,7 +10599,7 @@
           <a:p>
             <a:fld id="{1407A3B7-58FE-4A18-9F42-1771B36034B8}" type="datetimeFigureOut">
               <a:rPr lang="ar-SA" smtClean="0"/>
-              <a:t>14/12/1446</a:t>
+              <a:t>17/01/1447</a:t>
             </a:fld>
             <a:endParaRPr lang="ar-SA"/>
           </a:p>
@@ -11527,7 +11527,7 @@
           </a:lstStyle>
           <a:p>
             <a:r>
-              <a:rPr lang="en-US" smtClean="0"/>
+              <a:rPr lang="en-US"/>
               <a:t>Click to edit Master title style</a:t>
             </a:r>
             <a:endParaRPr lang="en-US" dirty="0"/>
@@ -11609,7 +11609,7 @@
               <a:buNone/>
             </a:pPr>
             <a:r>
-              <a:rPr lang="en-US" smtClean="0"/>
+              <a:rPr lang="en-US"/>
               <a:t>Click icon to add picture</a:t>
             </a:r>
             <a:endParaRPr lang="en-US" dirty="0"/>
@@ -11684,7 +11684,7 @@
           <a:p>
             <a:pPr lvl="0"/>
             <a:r>
-              <a:rPr lang="en-US" smtClean="0"/>
+              <a:rPr lang="en-US"/>
               <a:t>Click to edit Master text styles</a:t>
             </a:r>
           </a:p>
@@ -11707,7 +11707,7 @@
           <a:p>
             <a:fld id="{1407A3B7-58FE-4A18-9F42-1771B36034B8}" type="datetimeFigureOut">
               <a:rPr lang="ar-SA" smtClean="0"/>
-              <a:t>14/12/1446</a:t>
+              <a:t>17/01/1447</a:t>
             </a:fld>
             <a:endParaRPr lang="ar-SA"/>
           </a:p>
@@ -12602,7 +12602,7 @@
           <a:lstStyle/>
           <a:p>
             <a:r>
-              <a:rPr lang="en-US" smtClean="0"/>
+              <a:rPr lang="en-US"/>
               <a:t>Click to edit Master title style</a:t>
             </a:r>
             <a:endParaRPr lang="en-US" dirty="0"/>
@@ -12636,35 +12636,35 @@
           <a:p>
             <a:pPr lvl="0"/>
             <a:r>
-              <a:rPr lang="en-US" smtClean="0"/>
+              <a:rPr lang="en-US"/>
               <a:t>Click to edit Master text styles</a:t>
             </a:r>
           </a:p>
           <a:p>
             <a:pPr lvl="1"/>
             <a:r>
-              <a:rPr lang="en-US" smtClean="0"/>
+              <a:rPr lang="en-US"/>
               <a:t>Second level</a:t>
             </a:r>
           </a:p>
           <a:p>
             <a:pPr lvl="2"/>
             <a:r>
-              <a:rPr lang="en-US" smtClean="0"/>
+              <a:rPr lang="en-US"/>
               <a:t>Third level</a:t>
             </a:r>
           </a:p>
           <a:p>
             <a:pPr lvl="3"/>
             <a:r>
-              <a:rPr lang="en-US" smtClean="0"/>
+              <a:rPr lang="en-US"/>
               <a:t>Fourth level</a:t>
             </a:r>
           </a:p>
           <a:p>
             <a:pPr lvl="4"/>
             <a:r>
-              <a:rPr lang="en-US" smtClean="0"/>
+              <a:rPr lang="en-US"/>
               <a:t>Fifth level</a:t>
             </a:r>
             <a:endParaRPr lang="en-US" dirty="0"/>
@@ -12704,7 +12704,7 @@
           <a:p>
             <a:fld id="{1407A3B7-58FE-4A18-9F42-1771B36034B8}" type="datetimeFigureOut">
               <a:rPr lang="ar-SA" smtClean="0"/>
-              <a:t>14/12/1446</a:t>
+              <a:t>17/01/1447</a:t>
             </a:fld>
             <a:endParaRPr lang="ar-SA"/>
           </a:p>
@@ -13290,9 +13290,6 @@
               </a:rPr>
               <a:t>تطبيق التعرف على أبجدية لغة الإشارة التركية</a:t>
             </a:r>
-            <a:endParaRPr lang="ar-SA" dirty="0">
-              <a:latin typeface="Britannic Bold" panose="020B0903060703020204" pitchFamily="34" charset="0"/>
-            </a:endParaRPr>
           </a:p>
         </p:txBody>
       </p:sp>
@@ -13323,7 +13320,6 @@
               <a:rPr lang="ar-SA" dirty="0"/>
               <a:t>إعداد: عمرو نواف وليدي</a:t>
             </a:r>
-            <a:endParaRPr lang="ar-SA" dirty="0"/>
           </a:p>
         </p:txBody>
       </p:sp>
@@ -13337,13 +13333,6 @@
   <p:clrMapOvr>
     <a:masterClrMapping/>
   </p:clrMapOvr>
-  <p:timing>
-    <p:tnLst>
-      <p:par>
-        <p:cTn id="1" dur="indefinite" restart="never" nodeType="tmRoot"/>
-      </p:par>
-    </p:tnLst>
-  </p:timing>
 </p:sld>
 </file>
 
@@ -13381,11 +13370,11 @@
           <a:p>
             <a:pPr algn="r" rtl="0"/>
             <a:r>
-              <a:rPr lang="en-US" dirty="0" err="1" smtClean="0"/>
-              <a:t>Giriş</a:t>
+              <a:rPr lang="ar-YE" dirty="0"/>
+              <a:t>مدخل</a:t>
             </a:r>
             <a:r>
-              <a:rPr lang="en-US" dirty="0" smtClean="0"/>
+              <a:rPr lang="en-US" dirty="0"/>
               <a:t> </a:t>
             </a:r>
             <a:endParaRPr lang="ar-SA" dirty="0"/>
@@ -13421,23 +13410,15 @@
             </a:pPr>
             <a:r>
               <a:rPr lang="ar-SA" dirty="0"/>
-              <a:t>لغة الإشارة </a:t>
+              <a:t>لغة الإشارة التركية </a:t>
             </a:r>
             <a:r>
-              <a:rPr lang="ar-SA" dirty="0" smtClean="0"/>
-              <a:t>التركية </a:t>
-            </a:r>
-            <a:r>
-              <a:rPr lang="en-US" dirty="0" smtClean="0"/>
+              <a:rPr lang="en-US" dirty="0"/>
               <a:t>(TSL)، </a:t>
             </a:r>
             <a:r>
               <a:rPr lang="ar-SA" dirty="0"/>
-              <a:t>كغيرها من لغات الإشارة الوطنية، هي وسيلة تواصل أساسية للصم وضعاف السمع في تركيا. وتختلف عن اللغة التركية المنطوقة بتركيبها الغني وقواعدها النحوية الفريدة</a:t>
-            </a:r>
-            <a:r>
-              <a:rPr lang="ar-SA" dirty="0" smtClean="0"/>
-              <a:t>.</a:t>
+              <a:t>كغيرها من لغات الإشارة الوطنية، هي وسيلة تواصل أساسية للصم وضعاف السمع في تركيا. وتختلف عن اللغة التركية المنطوقة بتركيبها الغني وقواعدها النحوية الفريدة.</a:t>
             </a:r>
           </a:p>
           <a:p>
@@ -13446,7 +13427,7 @@
                 <a:spcPct val="150000"/>
               </a:lnSpc>
             </a:pPr>
-            <a:endParaRPr lang="en-US" dirty="0" smtClean="0"/>
+            <a:endParaRPr lang="en-US" dirty="0"/>
           </a:p>
           <a:p>
             <a:pPr algn="r"/>
@@ -13455,20 +13436,16 @@
               <a:t>مكّنت التطورات في التعلم العميق الآلات في مجال الرؤية الحاسوبية من تفسير البيانات المرئية بدقة عالية. وحققت الشبكات العصبية </a:t>
             </a:r>
             <a:r>
-              <a:rPr lang="ar-SA" dirty="0" err="1" smtClean="0"/>
+              <a:rPr lang="ar-SA" dirty="0" err="1"/>
               <a:t>التلافيفية</a:t>
             </a:r>
             <a:r>
-              <a:rPr lang="ar-SA" dirty="0" smtClean="0"/>
+              <a:rPr lang="ar-SA" dirty="0"/>
               <a:t> </a:t>
             </a:r>
             <a:r>
-              <a:rPr lang="en-US" dirty="0" smtClean="0"/>
-              <a:t> (CNNs</a:t>
-            </a:r>
-            <a:r>
               <a:rPr lang="en-US" dirty="0"/>
-              <a:t>)، </a:t>
+              <a:t> (CNNs)، </a:t>
             </a:r>
             <a:r>
               <a:rPr lang="ar-SA" dirty="0"/>
@@ -13483,89 +13460,57 @@
               <a:t> </a:t>
             </a:r>
             <a:r>
-              <a:rPr lang="ar-SA" dirty="0" smtClean="0"/>
-              <a:t> عام </a:t>
+              <a:rPr lang="ar-SA" dirty="0"/>
+              <a:t> عام ١٩٩٨ وروجت لها </a:t>
             </a:r>
             <a:r>
-              <a:rPr lang="ar-SA" dirty="0"/>
-              <a:t>١٩٩٨ وروجت لها </a:t>
-            </a:r>
-            <a:r>
-              <a:rPr lang="en-US" dirty="0" smtClean="0"/>
+              <a:rPr lang="en-US" dirty="0"/>
               <a:t> </a:t>
             </a:r>
             <a:r>
-              <a:rPr lang="en-US" dirty="0" err="1" smtClean="0"/>
+              <a:rPr lang="en-US" dirty="0" err="1"/>
               <a:t>AlexNet</a:t>
             </a:r>
             <a:r>
-              <a:rPr lang="en-US" dirty="0" smtClean="0"/>
+              <a:rPr lang="en-US" dirty="0"/>
               <a:t> </a:t>
             </a:r>
             <a:r>
               <a:rPr lang="ar-SA" dirty="0"/>
-              <a:t>عام ٢٠١٢، نجاحًا باهرًا في مهام تصنيف الصور، وخاصةً التعرف على إيماءات اليد</a:t>
+              <a:t>عام ٢٠١٢، نجاحًا باهرًا في مهام تصنيف الصور، وخاصةً التعرف على إيماءات اليد.</a:t>
+            </a:r>
+          </a:p>
+          <a:p>
+            <a:pPr algn="r"/>
+            <a:endParaRPr lang="ar-SA" dirty="0"/>
+          </a:p>
+          <a:p>
+            <a:r>
+              <a:rPr lang="ar-SA" dirty="0"/>
+              <a:t>في حين تناولت العديد من الدراسات استخدام  </a:t>
             </a:r>
             <a:r>
-              <a:rPr lang="ar-SA" dirty="0" smtClean="0"/>
-              <a:t>.</a:t>
-            </a:r>
-          </a:p>
-          <a:p>
-            <a:pPr algn="r"/>
-            <a:endParaRPr lang="ar-SA" dirty="0" smtClean="0"/>
-          </a:p>
-          <a:p>
-            <a:r>
-              <a:rPr lang="ar-SA" dirty="0"/>
-              <a:t>في حين تناولت العديد من الدراسات استخدام </a:t>
-            </a:r>
-            <a:r>
-              <a:rPr lang="ar-SA" dirty="0" smtClean="0"/>
-              <a:t> </a:t>
-            </a:r>
-            <a:r>
-              <a:rPr lang="en-US" dirty="0" smtClean="0"/>
+              <a:rPr lang="en-US" dirty="0"/>
               <a:t>CNN)</a:t>
             </a:r>
             <a:r>
-              <a:rPr lang="ar-SA" dirty="0" smtClean="0"/>
-              <a:t> ) في </a:t>
+              <a:rPr lang="ar-SA" dirty="0"/>
+              <a:t> ) في التعرف على لغة الإشارة خاصةً لغة الإشارة الأمريكية</a:t>
             </a:r>
             <a:r>
-              <a:rPr lang="ar-SA" dirty="0"/>
-              <a:t>التعرف على لغة الإشارة </a:t>
-            </a:r>
-            <a:r>
-              <a:rPr lang="ar-SA" dirty="0" smtClean="0"/>
-              <a:t>خاصةً </a:t>
-            </a:r>
-            <a:r>
-              <a:rPr lang="ar-SA" dirty="0"/>
-              <a:t>لغة الإشارة </a:t>
-            </a:r>
-            <a:r>
-              <a:rPr lang="ar-SA" dirty="0" smtClean="0"/>
-              <a:t>الأمريكية</a:t>
-            </a:r>
-            <a:r>
-              <a:rPr lang="en-US" dirty="0" smtClean="0"/>
+              <a:rPr lang="en-US" dirty="0"/>
               <a:t> (ASL) ، </a:t>
             </a:r>
             <a:r>
               <a:rPr lang="ar-SA" dirty="0"/>
-              <a:t>إلا أن الأبحاث ومجموعات البيانات المتاحة على نطاق واسع حول لغة الإشارة التركية قليلة</a:t>
+              <a:t>إلا أن الأبحاث ومجموعات البيانات المتاحة على نطاق واسع حول لغة الإشارة التركية قليلة.</a:t>
             </a:r>
-            <a:r>
-              <a:rPr lang="ar-SA" dirty="0" smtClean="0"/>
-              <a:t>.</a:t>
-            </a:r>
           </a:p>
           <a:p>
             <a:pPr marL="0" indent="0">
               <a:buNone/>
             </a:pPr>
-            <a:endParaRPr lang="ar-SA" dirty="0" smtClean="0"/>
+            <a:endParaRPr lang="ar-SA" dirty="0"/>
           </a:p>
           <a:p>
             <a:r>
@@ -13573,27 +13518,15 @@
               <a:t>يركز هذا </a:t>
             </a:r>
             <a:r>
-              <a:rPr lang="ar-SA" dirty="0" err="1" smtClean="0"/>
+              <a:rPr lang="ar-SA" dirty="0" err="1"/>
               <a:t>الإختراع</a:t>
             </a:r>
             <a:r>
-              <a:rPr lang="ar-SA" dirty="0" smtClean="0"/>
-              <a:t> على </a:t>
+              <a:rPr lang="ar-SA" dirty="0"/>
+              <a:t> على بناء نظام ثابت للتعرف على إشارات أبجدية لغة الإشارة التركية يعتمد على التعلم العميق القائم على </a:t>
             </a:r>
             <a:r>
-              <a:rPr lang="ar-SA" dirty="0"/>
-              <a:t>بناء نظام ثابت للتعرف على إشارات أبجدية لغة الإشارة </a:t>
-            </a:r>
-            <a:r>
-              <a:rPr lang="ar-SA" dirty="0" smtClean="0"/>
-              <a:t>التركية يعتمد </a:t>
-            </a:r>
-            <a:r>
-              <a:rPr lang="ar-SA" dirty="0"/>
-              <a:t>على التعلم العميق القائم على </a:t>
-            </a:r>
-            <a:r>
-              <a:rPr lang="en-US" dirty="0" smtClean="0"/>
+              <a:rPr lang="en-US" dirty="0"/>
               <a:t> .(CNN)</a:t>
             </a:r>
             <a:endParaRPr lang="ar-SA" dirty="0"/>
@@ -13610,13 +13543,6 @@
   <p:clrMapOvr>
     <a:masterClrMapping/>
   </p:clrMapOvr>
-  <p:timing>
-    <p:tnLst>
-      <p:par>
-        <p:cTn id="1" dur="indefinite" restart="never" nodeType="tmRoot"/>
-      </p:par>
-    </p:tnLst>
-  </p:timing>
 </p:sld>
 </file>
 
@@ -13657,7 +13583,6 @@
               <a:rPr lang="ar-SA" dirty="0"/>
               <a:t>مجموعة البيانات</a:t>
             </a:r>
-            <a:endParaRPr lang="ar-SA" dirty="0"/>
           </a:p>
         </p:txBody>
       </p:sp>
@@ -13693,47 +13618,31 @@
             </a:r>
             <a:r>
               <a:rPr lang="ar-SA" dirty="0"/>
-              <a:t> الإلكتروني، وهي تتكون من 29 فئة من الأبجدية التركية الـ 29، ويتألف كل فئة من حوالي 100 صورة تمثل هذه الأبجدية</a:t>
+              <a:t> الإلكتروني، وهي تتكون من 29 فئة من الأبجدية التركية الـ 29، ويتألف كل فئة من حوالي 100 صورة تمثل هذه الأبجدية.</a:t>
             </a:r>
-            <a:r>
-              <a:rPr lang="ar-SA" dirty="0" smtClean="0"/>
-              <a:t>.</a:t>
-            </a:r>
           </a:p>
           <a:p>
             <a:pPr marL="0" indent="0">
               <a:buNone/>
             </a:pPr>
-            <a:endParaRPr lang="ar-SA" dirty="0" smtClean="0"/>
-          </a:p>
-          <a:p>
-            <a:r>
-              <a:rPr lang="ar-SA" dirty="0" smtClean="0"/>
-              <a:t>تم </a:t>
-            </a:r>
+            <a:endParaRPr lang="ar-SA" dirty="0"/>
+          </a:p>
+          <a:p>
             <a:r>
               <a:rPr lang="ar-SA" dirty="0"/>
-              <a:t>بعد ذلك تغيير حجم جميع الصور إلى حجم ثابت 400 × 400 بكسل، مع استخدام خلفية بيضاء لملء الفراغات في الصورة. تساعد هذه التقنية في الحفاظ على وضوح الصورة وهويتها</a:t>
+              <a:t>تم بعد ذلك تغيير حجم جميع الصور إلى حجم ثابت 400 × 400 بكسل، مع استخدام خلفية بيضاء لملء الفراغات في الصورة. تساعد هذه التقنية في الحفاظ على وضوح الصورة وهويتها.</a:t>
             </a:r>
-            <a:r>
-              <a:rPr lang="ar-SA" dirty="0" smtClean="0"/>
-              <a:t>.</a:t>
-            </a:r>
           </a:p>
           <a:p>
             <a:pPr marL="0" indent="0">
               <a:buNone/>
             </a:pPr>
-            <a:endParaRPr lang="ar-SA" dirty="0" smtClean="0"/>
-          </a:p>
-          <a:p>
-            <a:r>
-              <a:rPr lang="ar-SA" dirty="0" smtClean="0"/>
-              <a:t>بعد </a:t>
-            </a:r>
+            <a:endParaRPr lang="ar-SA" dirty="0"/>
+          </a:p>
+          <a:p>
             <a:r>
               <a:rPr lang="ar-SA" dirty="0"/>
-              <a:t>المعالجة المسبقة للصور لكل صورة، تم إنشاء ملف تسمية لمساعدة نموذج </a:t>
+              <a:t>بعد المعالجة المسبقة للصور لكل صورة، تم إنشاء ملف تسمية لمساعدة نموذج </a:t>
             </a:r>
             <a:r>
               <a:rPr lang="en-US" dirty="0"/>
@@ -13743,7 +13652,6 @@
               <a:rPr lang="ar-SA" dirty="0"/>
               <a:t>في تحديد معرف فئة إشارة اليد وإحداثياتها للتدريب.</a:t>
             </a:r>
-            <a:endParaRPr lang="ar-SA" dirty="0"/>
           </a:p>
         </p:txBody>
       </p:sp>
@@ -13757,13 +13665,6 @@
   <p:clrMapOvr>
     <a:masterClrMapping/>
   </p:clrMapOvr>
-  <p:timing>
-    <p:tnLst>
-      <p:par>
-        <p:cTn id="1" dur="indefinite" restart="never" nodeType="tmRoot"/>
-      </p:par>
-    </p:tnLst>
-  </p:timing>
 </p:sld>
 </file>
 
@@ -13804,7 +13705,6 @@
               <a:rPr lang="ar-SA" dirty="0"/>
               <a:t>توزيع النظام</a:t>
             </a:r>
-            <a:endParaRPr lang="ar-SA" dirty="0"/>
           </a:p>
         </p:txBody>
       </p:sp>
@@ -13827,15 +13727,7 @@
           <a:p>
             <a:r>
               <a:rPr lang="ar-SA" dirty="0"/>
-              <a:t>لقياس قابلية الاستخدام العملي للنموذج، دُمج في نظام </a:t>
-            </a:r>
-            <a:r>
-              <a:rPr lang="ar-SA" dirty="0" smtClean="0"/>
-              <a:t>تعرف </a:t>
-            </a:r>
-            <a:r>
-              <a:rPr lang="ar-SA" dirty="0"/>
-              <a:t>حقيقي.</a:t>
+              <a:t>لقياس قابلية الاستخدام العملي للنموذج، دُمج في نظام تعرف حقيقي.</a:t>
             </a:r>
           </a:p>
           <a:p>
@@ -13847,23 +13739,19 @@
               <a:t>استُخدم خادم </a:t>
             </a:r>
             <a:r>
-              <a:rPr lang="en-US" dirty="0" smtClean="0"/>
+              <a:rPr lang="en-US" dirty="0"/>
               <a:t> Flask </a:t>
             </a:r>
             <a:r>
               <a:rPr lang="ar-SA" dirty="0"/>
-              <a:t>لاستضافة النموذج وقبول مدخلات الصور من تطبيق جوال قائم </a:t>
+              <a:t>لاستضافة النموذج وقبول مدخلات الصور من تطبيق جوال قائم على </a:t>
             </a:r>
             <a:r>
-              <a:rPr lang="ar-SA" dirty="0" smtClean="0"/>
-              <a:t>على </a:t>
-            </a:r>
-            <a:r>
-              <a:rPr lang="en-US" dirty="0" smtClean="0"/>
+              <a:rPr lang="en-US" dirty="0"/>
               <a:t>Flutter</a:t>
             </a:r>
             <a:r>
-              <a:rPr lang="ar-SA" dirty="0" smtClean="0"/>
+              <a:rPr lang="ar-SA" dirty="0"/>
               <a:t>.</a:t>
             </a:r>
           </a:p>
@@ -13876,15 +13764,7 @@
           <a:p>
             <a:r>
               <a:rPr lang="ar-SA" dirty="0"/>
-              <a:t>التقط التطبيق صورًا </a:t>
-            </a:r>
-            <a:r>
-              <a:rPr lang="ar-SA" dirty="0" smtClean="0"/>
-              <a:t>لإشارات </a:t>
-            </a:r>
-            <a:r>
-              <a:rPr lang="ar-SA" dirty="0"/>
-              <a:t>اليد عبر كاميرا الهاتف، وأرسلها إلى الواجهة الخلفية للتنبؤ بها.</a:t>
+              <a:t>التقط التطبيق صورًا لإشارات اليد عبر كاميرا الهاتف، وأرسلها إلى الواجهة الخلفية للتنبؤ بها.</a:t>
             </a:r>
           </a:p>
           <a:p>
@@ -13904,7 +13784,6 @@
               <a:rPr lang="ar-SA" dirty="0"/>
               <a:t>يُعرض الحرف المتوقع في واجهة المستخدم.</a:t>
             </a:r>
-            <a:endParaRPr lang="ar-SA" dirty="0"/>
           </a:p>
         </p:txBody>
       </p:sp>
@@ -13918,13 +13797,6 @@
   <p:clrMapOvr>
     <a:masterClrMapping/>
   </p:clrMapOvr>
-  <p:timing>
-    <p:tnLst>
-      <p:par>
-        <p:cTn id="1" dur="indefinite" restart="never" nodeType="tmRoot"/>
-      </p:par>
-    </p:tnLst>
-  </p:timing>
 </p:sld>
 </file>
 
@@ -13962,10 +13834,9 @@
           <a:p>
             <a:pPr algn="r" rtl="0"/>
             <a:r>
-              <a:rPr lang="ar-SA" dirty="0" smtClean="0"/>
+              <a:rPr lang="ar-SA" dirty="0"/>
               <a:t>التطبيق</a:t>
             </a:r>
-            <a:endParaRPr lang="ar-SA" dirty="0"/>
           </a:p>
         </p:txBody>
       </p:sp>
@@ -14240,13 +14111,6 @@
   <p:clrMapOvr>
     <a:masterClrMapping/>
   </p:clrMapOvr>
-  <p:timing>
-    <p:tnLst>
-      <p:par>
-        <p:cTn id="1" dur="indefinite" restart="never" nodeType="tmRoot"/>
-      </p:par>
-    </p:tnLst>
-  </p:timing>
 </p:sld>
 </file>
 

</xml_diff>